<commit_message>
update poster and source code
</commit_message>
<xml_diff>
--- a/poster/poster.pptx
+++ b/poster/poster.pptx
@@ -1492,8 +1492,8 @@
         </p:nvSpPr>
         <p:spPr>
           <a:xfrm>
-            <a:off x="20441296" y="11217033"/>
-            <a:ext cx="389076" cy="680073"/>
+            <a:off x="29921196" y="13007097"/>
+            <a:ext cx="520703" cy="1067501"/>
           </a:xfrm>
           <a:prstGeom prst="downArrow">
             <a:avLst/>
@@ -1532,8 +1532,8 @@
         </p:nvSpPr>
         <p:spPr>
           <a:xfrm rot="5400000">
-            <a:off x="15769293" y="16948748"/>
-            <a:ext cx="718310" cy="632514"/>
+            <a:off x="15615639" y="16795095"/>
+            <a:ext cx="744971" cy="913160"/>
           </a:xfrm>
           <a:prstGeom prst="bentArrow">
             <a:avLst/>
@@ -1577,7 +1577,7 @@
         <p:spPr>
           <a:xfrm>
             <a:off x="23608840" y="8443267"/>
-            <a:ext cx="9331437" cy="12058942"/>
+            <a:ext cx="9331437" cy="11244360"/>
           </a:xfrm>
           <a:prstGeom prst="rect">
             <a:avLst/>
@@ -1606,36 +1606,29 @@
                 <a:latin typeface="Arial" pitchFamily="34" charset="0"/>
                 <a:cs typeface="Arial" pitchFamily="34" charset="0"/>
               </a:rPr>
-              <a:t>The New York Times Obama budget data</a:t>
+              <a:t>The New York Times Obama budget </a:t>
             </a:r>
-          </a:p>
-          <a:p>
-            <a:pPr>
-              <a:lnSpc>
-                <a:spcPct val="110000"/>
-              </a:lnSpc>
-              <a:spcAft>
-                <a:spcPts val="1600"/>
-              </a:spcAft>
-            </a:pPr>
-            <a:endParaRPr lang="en-US" altLang="zh-CN" sz="3600" b="1" dirty="0" smtClean="0">
-              <a:solidFill>
-                <a:srgbClr val="9E7E38"/>
-              </a:solidFill>
-              <a:latin typeface="Arial" pitchFamily="34" charset="0"/>
-              <a:cs typeface="Arial" pitchFamily="34" charset="0"/>
-            </a:endParaRPr>
-          </a:p>
-          <a:p>
-            <a:pPr>
-              <a:lnSpc>
-                <a:spcPct val="110000"/>
-              </a:lnSpc>
-              <a:spcAft>
-                <a:spcPts val="1600"/>
-              </a:spcAft>
-            </a:pPr>
-            <a:endParaRPr lang="en-US" altLang="zh-CN" sz="3600" b="1" dirty="0">
+            <a:r>
+              <a:rPr lang="en-US" altLang="zh-CN" sz="3600" b="1" dirty="0" smtClean="0">
+                <a:solidFill>
+                  <a:srgbClr val="9E7E38"/>
+                </a:solidFill>
+                <a:latin typeface="Arial" pitchFamily="34" charset="0"/>
+                <a:cs typeface="Arial" pitchFamily="34" charset="0"/>
+              </a:rPr>
+              <a:t>data</a:t>
+            </a:r>
+          </a:p>
+          <a:p>
+            <a:pPr>
+              <a:lnSpc>
+                <a:spcPct val="110000"/>
+              </a:lnSpc>
+              <a:spcAft>
+                <a:spcPts val="1600"/>
+              </a:spcAft>
+            </a:pPr>
+            <a:endParaRPr lang="en-US" altLang="zh-CN" sz="3200" b="1" dirty="0">
               <a:solidFill>
                 <a:srgbClr val="9E7E38"/>
               </a:solidFill>
@@ -1953,8 +1946,8 @@
         </p:nvSpPr>
         <p:spPr>
           <a:xfrm rot="5400000" flipV="1">
-            <a:off x="10446217" y="17129290"/>
-            <a:ext cx="640530" cy="547268"/>
+            <a:off x="10529009" y="16843028"/>
+            <a:ext cx="844000" cy="916322"/>
           </a:xfrm>
           <a:prstGeom prst="bentArrow">
             <a:avLst/>
@@ -2051,8 +2044,38 @@
         </p:blipFill>
         <p:spPr>
           <a:xfrm>
-            <a:off x="28018948" y="17768511"/>
+            <a:off x="28084760" y="18023672"/>
             <a:ext cx="4193574" cy="2727494"/>
+          </a:xfrm>
+          <a:prstGeom prst="rect">
+            <a:avLst/>
+          </a:prstGeom>
+        </p:spPr>
+      </p:pic>
+      <p:pic>
+        <p:nvPicPr>
+          <p:cNvPr id="27" name="图片 26"/>
+          <p:cNvPicPr>
+            <a:picLocks noChangeAspect="1"/>
+          </p:cNvPicPr>
+          <p:nvPr/>
+        </p:nvPicPr>
+        <p:blipFill>
+          <a:blip r:embed="rId11">
+            <a:extLst>
+              <a:ext uri="{28A0092B-C50C-407E-A947-70E740481C1C}">
+                <a14:useLocalDpi xmlns:a14="http://schemas.microsoft.com/office/drawing/2010/main" val="0"/>
+              </a:ext>
+            </a:extLst>
+          </a:blip>
+          <a:stretch>
+            <a:fillRect/>
+          </a:stretch>
+        </p:blipFill>
+        <p:spPr>
+          <a:xfrm>
+            <a:off x="9173455" y="11926255"/>
+            <a:ext cx="3186197" cy="2959768"/>
           </a:xfrm>
           <a:prstGeom prst="rect">
             <a:avLst/>
@@ -2061,16 +2084,16 @@
       </p:pic>
       <p:sp>
         <p:nvSpPr>
-          <p:cNvPr id="46" name="右箭头 45"/>
+          <p:cNvPr id="34" name="圆角右箭头 33"/>
           <p:cNvSpPr/>
           <p:nvPr/>
         </p:nvSpPr>
         <p:spPr>
-          <a:xfrm>
-            <a:off x="26815418" y="19240497"/>
-            <a:ext cx="1115259" cy="447346"/>
-          </a:xfrm>
-          <a:prstGeom prst="rightArrow">
+          <a:xfrm flipV="1">
+            <a:off x="2453570" y="11325313"/>
+            <a:ext cx="1255158" cy="1071061"/>
+          </a:xfrm>
+          <a:prstGeom prst="bentArrow">
             <a:avLst/>
           </a:prstGeom>
         </p:spPr>
@@ -2095,50 +2118,24 @@
           <a:lstStyle/>
           <a:p>
             <a:pPr algn="ctr"/>
-            <a:endParaRPr lang="zh-CN" altLang="en-US"/>
+            <a:endParaRPr lang="zh-CN" altLang="en-US">
+              <a:solidFill>
+                <a:schemeClr val="tx1"/>
+              </a:solidFill>
+            </a:endParaRPr>
           </a:p>
         </p:txBody>
       </p:sp>
-      <p:pic>
-        <p:nvPicPr>
-          <p:cNvPr id="27" name="图片 26"/>
-          <p:cNvPicPr>
-            <a:picLocks noChangeAspect="1"/>
-          </p:cNvPicPr>
-          <p:nvPr/>
-        </p:nvPicPr>
-        <p:blipFill>
-          <a:blip r:embed="rId11">
-            <a:extLst>
-              <a:ext uri="{28A0092B-C50C-407E-A947-70E740481C1C}">
-                <a14:useLocalDpi xmlns:a14="http://schemas.microsoft.com/office/drawing/2010/main" val="0"/>
-              </a:ext>
-            </a:extLst>
-          </a:blip>
-          <a:stretch>
-            <a:fillRect/>
-          </a:stretch>
-        </p:blipFill>
-        <p:spPr>
-          <a:xfrm>
-            <a:off x="9173455" y="11926255"/>
-            <a:ext cx="3186197" cy="2959768"/>
-          </a:xfrm>
-          <a:prstGeom prst="rect">
-            <a:avLst/>
-          </a:prstGeom>
-        </p:spPr>
-      </p:pic>
       <p:sp>
         <p:nvSpPr>
-          <p:cNvPr id="34" name="圆角右箭头 33"/>
+          <p:cNvPr id="2" name="圆角右箭头 1"/>
           <p:cNvSpPr/>
           <p:nvPr/>
         </p:nvSpPr>
         <p:spPr>
-          <a:xfrm flipV="1">
-            <a:off x="2453570" y="11325313"/>
-            <a:ext cx="1255158" cy="1071061"/>
+          <a:xfrm>
+            <a:off x="25998984" y="11333885"/>
+            <a:ext cx="2231889" cy="757060"/>
           </a:xfrm>
           <a:prstGeom prst="bentArrow">
             <a:avLst/>
@@ -2175,14 +2172,14 @@
       </p:sp>
       <p:sp>
         <p:nvSpPr>
-          <p:cNvPr id="2" name="圆角右箭头 1"/>
+          <p:cNvPr id="6" name="圆角右箭头 5"/>
           <p:cNvSpPr/>
           <p:nvPr/>
         </p:nvSpPr>
         <p:spPr>
-          <a:xfrm>
-            <a:off x="26032267" y="11140046"/>
-            <a:ext cx="2231889" cy="757060"/>
+          <a:xfrm flipV="1">
+            <a:off x="25994785" y="14170066"/>
+            <a:ext cx="1686759" cy="715957"/>
           </a:xfrm>
           <a:prstGeom prst="bentArrow">
             <a:avLst/>
@@ -2217,18 +2214,288 @@
           </a:p>
         </p:txBody>
       </p:sp>
+      <p:pic>
+        <p:nvPicPr>
+          <p:cNvPr id="11" name="图片 10"/>
+          <p:cNvPicPr>
+            <a:picLocks noChangeAspect="1"/>
+          </p:cNvPicPr>
+          <p:nvPr/>
+        </p:nvPicPr>
+        <p:blipFill>
+          <a:blip r:embed="rId12">
+            <a:extLst>
+              <a:ext uri="{28A0092B-C50C-407E-A947-70E740481C1C}">
+                <a14:useLocalDpi xmlns:a14="http://schemas.microsoft.com/office/drawing/2010/main" val="0"/>
+              </a:ext>
+            </a:extLst>
+          </a:blip>
+          <a:stretch>
+            <a:fillRect/>
+          </a:stretch>
+        </p:blipFill>
+        <p:spPr>
+          <a:xfrm>
+            <a:off x="587873" y="8030489"/>
+            <a:ext cx="4794658" cy="3296983"/>
+          </a:xfrm>
+          <a:prstGeom prst="rect">
+            <a:avLst/>
+          </a:prstGeom>
+        </p:spPr>
+      </p:pic>
+      <p:pic>
+        <p:nvPicPr>
+          <p:cNvPr id="5" name="图片 4"/>
+          <p:cNvPicPr>
+            <a:picLocks noChangeAspect="1"/>
+          </p:cNvPicPr>
+          <p:nvPr/>
+        </p:nvPicPr>
+        <p:blipFill>
+          <a:blip r:embed="rId13">
+            <a:extLst>
+              <a:ext uri="{28A0092B-C50C-407E-A947-70E740481C1C}">
+                <a14:useLocalDpi xmlns:a14="http://schemas.microsoft.com/office/drawing/2010/main" val="0"/>
+              </a:ext>
+            </a:extLst>
+          </a:blip>
+          <a:stretch>
+            <a:fillRect/>
+          </a:stretch>
+        </p:blipFill>
+        <p:spPr>
+          <a:xfrm>
+            <a:off x="3711578" y="9682566"/>
+            <a:ext cx="4457700" cy="3285495"/>
+          </a:xfrm>
+          <a:prstGeom prst="rect">
+            <a:avLst/>
+          </a:prstGeom>
+        </p:spPr>
+      </p:pic>
+      <p:pic>
+        <p:nvPicPr>
+          <p:cNvPr id="10" name="图片 9"/>
+          <p:cNvPicPr>
+            <a:picLocks noChangeAspect="1"/>
+          </p:cNvPicPr>
+          <p:nvPr/>
+        </p:nvPicPr>
+        <p:blipFill>
+          <a:blip r:embed="rId14">
+            <a:extLst>
+              <a:ext uri="{28A0092B-C50C-407E-A947-70E740481C1C}">
+                <a14:useLocalDpi xmlns:a14="http://schemas.microsoft.com/office/drawing/2010/main" val="0"/>
+              </a:ext>
+            </a:extLst>
+          </a:blip>
+          <a:stretch>
+            <a:fillRect/>
+          </a:stretch>
+        </p:blipFill>
+        <p:spPr>
+          <a:xfrm>
+            <a:off x="6594532" y="10154816"/>
+            <a:ext cx="1552381" cy="314286"/>
+          </a:xfrm>
+          <a:prstGeom prst="rect">
+            <a:avLst/>
+          </a:prstGeom>
+        </p:spPr>
+      </p:pic>
+      <p:pic>
+        <p:nvPicPr>
+          <p:cNvPr id="13" name="图片 12"/>
+          <p:cNvPicPr>
+            <a:picLocks noChangeAspect="1"/>
+          </p:cNvPicPr>
+          <p:nvPr/>
+        </p:nvPicPr>
+        <p:blipFill>
+          <a:blip r:embed="rId15">
+            <a:extLst>
+              <a:ext uri="{28A0092B-C50C-407E-A947-70E740481C1C}">
+                <a14:useLocalDpi xmlns:a14="http://schemas.microsoft.com/office/drawing/2010/main" val="0"/>
+              </a:ext>
+            </a:extLst>
+          </a:blip>
+          <a:stretch>
+            <a:fillRect/>
+          </a:stretch>
+        </p:blipFill>
+        <p:spPr>
+          <a:xfrm>
+            <a:off x="18503548" y="8974392"/>
+            <a:ext cx="4264571" cy="2302474"/>
+          </a:xfrm>
+          <a:prstGeom prst="rect">
+            <a:avLst/>
+          </a:prstGeom>
+        </p:spPr>
+      </p:pic>
+      <p:pic>
+        <p:nvPicPr>
+          <p:cNvPr id="7" name="图片 6"/>
+          <p:cNvPicPr>
+            <a:picLocks noChangeAspect="1"/>
+          </p:cNvPicPr>
+          <p:nvPr/>
+        </p:nvPicPr>
+        <p:blipFill>
+          <a:blip r:embed="rId16" cstate="print">
+            <a:extLst>
+              <a:ext uri="{28A0092B-C50C-407E-A947-70E740481C1C}">
+                <a14:useLocalDpi xmlns:a14="http://schemas.microsoft.com/office/drawing/2010/main" val="0"/>
+              </a:ext>
+            </a:extLst>
+          </a:blip>
+          <a:stretch>
+            <a:fillRect/>
+          </a:stretch>
+        </p:blipFill>
+        <p:spPr>
+          <a:xfrm>
+            <a:off x="8773791" y="9008294"/>
+            <a:ext cx="3836836" cy="2317020"/>
+          </a:xfrm>
+          <a:prstGeom prst="rect">
+            <a:avLst/>
+          </a:prstGeom>
+        </p:spPr>
+      </p:pic>
+      <p:pic>
+        <p:nvPicPr>
+          <p:cNvPr id="8" name="图片 7"/>
+          <p:cNvPicPr>
+            <a:picLocks noChangeAspect="1"/>
+          </p:cNvPicPr>
+          <p:nvPr/>
+        </p:nvPicPr>
+        <p:blipFill>
+          <a:blip r:embed="rId17" cstate="print">
+            <a:extLst>
+              <a:ext uri="{28A0092B-C50C-407E-A947-70E740481C1C}">
+                <a14:useLocalDpi xmlns:a14="http://schemas.microsoft.com/office/drawing/2010/main" val="0"/>
+              </a:ext>
+            </a:extLst>
+          </a:blip>
+          <a:stretch>
+            <a:fillRect/>
+          </a:stretch>
+        </p:blipFill>
+        <p:spPr>
+          <a:xfrm>
+            <a:off x="13650822" y="9008294"/>
+            <a:ext cx="3812531" cy="2288445"/>
+          </a:xfrm>
+          <a:prstGeom prst="rect">
+            <a:avLst/>
+          </a:prstGeom>
+        </p:spPr>
+      </p:pic>
+      <p:pic>
+        <p:nvPicPr>
+          <p:cNvPr id="15" name="图片 14"/>
+          <p:cNvPicPr>
+            <a:picLocks noChangeAspect="1"/>
+          </p:cNvPicPr>
+          <p:nvPr/>
+        </p:nvPicPr>
+        <p:blipFill>
+          <a:blip r:embed="rId18" cstate="print">
+            <a:extLst>
+              <a:ext uri="{28A0092B-C50C-407E-A947-70E740481C1C}">
+                <a14:useLocalDpi xmlns:a14="http://schemas.microsoft.com/office/drawing/2010/main" val="0"/>
+              </a:ext>
+            </a:extLst>
+          </a:blip>
+          <a:stretch>
+            <a:fillRect/>
+          </a:stretch>
+        </p:blipFill>
+        <p:spPr>
+          <a:xfrm>
+            <a:off x="11520248" y="15044210"/>
+            <a:ext cx="3956268" cy="2379530"/>
+          </a:xfrm>
+          <a:prstGeom prst="rect">
+            <a:avLst/>
+          </a:prstGeom>
+        </p:spPr>
+      </p:pic>
+      <p:pic>
+        <p:nvPicPr>
+          <p:cNvPr id="17" name="图片 16"/>
+          <p:cNvPicPr>
+            <a:picLocks noChangeAspect="1"/>
+          </p:cNvPicPr>
+          <p:nvPr/>
+        </p:nvPicPr>
+        <p:blipFill>
+          <a:blip r:embed="rId19" cstate="print">
+            <a:extLst>
+              <a:ext uri="{28A0092B-C50C-407E-A947-70E740481C1C}">
+                <a14:useLocalDpi xmlns:a14="http://schemas.microsoft.com/office/drawing/2010/main" val="0"/>
+              </a:ext>
+            </a:extLst>
+          </a:blip>
+          <a:stretch>
+            <a:fillRect/>
+          </a:stretch>
+        </p:blipFill>
+        <p:spPr>
+          <a:xfrm>
+            <a:off x="19310849" y="15044210"/>
+            <a:ext cx="3977507" cy="2135637"/>
+          </a:xfrm>
+          <a:prstGeom prst="rect">
+            <a:avLst/>
+          </a:prstGeom>
+        </p:spPr>
+      </p:pic>
+      <p:pic>
+        <p:nvPicPr>
+          <p:cNvPr id="21" name="图片 20"/>
+          <p:cNvPicPr>
+            <a:picLocks noChangeAspect="1"/>
+          </p:cNvPicPr>
+          <p:nvPr/>
+        </p:nvPicPr>
+        <p:blipFill>
+          <a:blip r:embed="rId20" cstate="print">
+            <a:extLst>
+              <a:ext uri="{28A0092B-C50C-407E-A947-70E740481C1C}">
+                <a14:useLocalDpi xmlns:a14="http://schemas.microsoft.com/office/drawing/2010/main" val="0"/>
+              </a:ext>
+            </a:extLst>
+          </a:blip>
+          <a:stretch>
+            <a:fillRect/>
+          </a:stretch>
+        </p:blipFill>
+        <p:spPr>
+          <a:xfrm>
+            <a:off x="23553811" y="12233418"/>
+            <a:ext cx="4420703" cy="1709786"/>
+          </a:xfrm>
+          <a:prstGeom prst="rect">
+            <a:avLst/>
+          </a:prstGeom>
+        </p:spPr>
+      </p:pic>
       <p:sp>
         <p:nvSpPr>
-          <p:cNvPr id="6" name="圆角右箭头 5"/>
+          <p:cNvPr id="41" name="下箭头 40"/>
           <p:cNvSpPr/>
           <p:nvPr/>
         </p:nvSpPr>
         <p:spPr>
-          <a:xfrm flipV="1">
-            <a:off x="26032267" y="15133643"/>
-            <a:ext cx="1686759" cy="715957"/>
-          </a:xfrm>
-          <a:prstGeom prst="bentArrow">
+          <a:xfrm>
+            <a:off x="20441296" y="11217033"/>
+            <a:ext cx="389076" cy="680073"/>
+          </a:xfrm>
+          <a:prstGeom prst="downArrow">
             <a:avLst/>
           </a:prstGeom>
         </p:spPr>
@@ -2253,254 +2520,50 @@
           <a:lstStyle/>
           <a:p>
             <a:pPr algn="ctr"/>
-            <a:endParaRPr lang="zh-CN" altLang="en-US">
-              <a:solidFill>
-                <a:schemeClr val="tx1"/>
-              </a:solidFill>
-            </a:endParaRPr>
+            <a:endParaRPr lang="zh-CN" altLang="en-US"/>
           </a:p>
         </p:txBody>
       </p:sp>
-      <p:pic>
-        <p:nvPicPr>
-          <p:cNvPr id="11" name="图片 10"/>
-          <p:cNvPicPr>
-            <a:picLocks noChangeAspect="1"/>
-          </p:cNvPicPr>
-          <p:nvPr/>
-        </p:nvPicPr>
-        <p:blipFill>
-          <a:blip r:embed="rId12">
-            <a:extLst>
-              <a:ext uri="{28A0092B-C50C-407E-A947-70E740481C1C}">
-                <a14:useLocalDpi xmlns:a14="http://schemas.microsoft.com/office/drawing/2010/main" val="0"/>
-              </a:ext>
-            </a:extLst>
-          </a:blip>
-          <a:stretch>
-            <a:fillRect/>
-          </a:stretch>
-        </p:blipFill>
-        <p:spPr>
-          <a:xfrm>
-            <a:off x="587873" y="8030489"/>
-            <a:ext cx="4794658" cy="3296983"/>
-          </a:xfrm>
-          <a:prstGeom prst="rect">
-            <a:avLst/>
-          </a:prstGeom>
-        </p:spPr>
-      </p:pic>
-      <p:pic>
-        <p:nvPicPr>
-          <p:cNvPr id="5" name="图片 4"/>
-          <p:cNvPicPr>
-            <a:picLocks noChangeAspect="1"/>
-          </p:cNvPicPr>
-          <p:nvPr/>
-        </p:nvPicPr>
-        <p:blipFill>
-          <a:blip r:embed="rId13">
-            <a:extLst>
-              <a:ext uri="{28A0092B-C50C-407E-A947-70E740481C1C}">
-                <a14:useLocalDpi xmlns:a14="http://schemas.microsoft.com/office/drawing/2010/main" val="0"/>
-              </a:ext>
-            </a:extLst>
-          </a:blip>
-          <a:stretch>
-            <a:fillRect/>
-          </a:stretch>
-        </p:blipFill>
-        <p:spPr>
-          <a:xfrm>
-            <a:off x="3711578" y="9682566"/>
-            <a:ext cx="4457700" cy="3285495"/>
-          </a:xfrm>
-          <a:prstGeom prst="rect">
-            <a:avLst/>
-          </a:prstGeom>
-        </p:spPr>
-      </p:pic>
-      <p:pic>
-        <p:nvPicPr>
-          <p:cNvPr id="10" name="图片 9"/>
-          <p:cNvPicPr>
-            <a:picLocks noChangeAspect="1"/>
-          </p:cNvPicPr>
-          <p:nvPr/>
-        </p:nvPicPr>
-        <p:blipFill>
-          <a:blip r:embed="rId14">
-            <a:extLst>
-              <a:ext uri="{28A0092B-C50C-407E-A947-70E740481C1C}">
-                <a14:useLocalDpi xmlns:a14="http://schemas.microsoft.com/office/drawing/2010/main" val="0"/>
-              </a:ext>
-            </a:extLst>
-          </a:blip>
-          <a:stretch>
-            <a:fillRect/>
-          </a:stretch>
-        </p:blipFill>
-        <p:spPr>
-          <a:xfrm>
-            <a:off x="6594532" y="10154816"/>
-            <a:ext cx="1552381" cy="314286"/>
-          </a:xfrm>
-          <a:prstGeom prst="rect">
-            <a:avLst/>
-          </a:prstGeom>
-        </p:spPr>
-      </p:pic>
-      <p:pic>
-        <p:nvPicPr>
-          <p:cNvPr id="13" name="图片 12"/>
-          <p:cNvPicPr>
-            <a:picLocks noChangeAspect="1"/>
-          </p:cNvPicPr>
-          <p:nvPr/>
-        </p:nvPicPr>
-        <p:blipFill>
-          <a:blip r:embed="rId15">
-            <a:extLst>
-              <a:ext uri="{28A0092B-C50C-407E-A947-70E740481C1C}">
-                <a14:useLocalDpi xmlns:a14="http://schemas.microsoft.com/office/drawing/2010/main" val="0"/>
-              </a:ext>
-            </a:extLst>
-          </a:blip>
-          <a:stretch>
-            <a:fillRect/>
-          </a:stretch>
-        </p:blipFill>
-        <p:spPr>
-          <a:xfrm>
-            <a:off x="18503548" y="8974392"/>
-            <a:ext cx="4264571" cy="2302474"/>
-          </a:xfrm>
-          <a:prstGeom prst="rect">
-            <a:avLst/>
-          </a:prstGeom>
-        </p:spPr>
-      </p:pic>
-      <p:pic>
-        <p:nvPicPr>
-          <p:cNvPr id="7" name="图片 6"/>
-          <p:cNvPicPr>
-            <a:picLocks noChangeAspect="1"/>
-          </p:cNvPicPr>
-          <p:nvPr/>
-        </p:nvPicPr>
-        <p:blipFill>
-          <a:blip r:embed="rId16" cstate="print">
-            <a:extLst>
-              <a:ext uri="{28A0092B-C50C-407E-A947-70E740481C1C}">
-                <a14:useLocalDpi xmlns:a14="http://schemas.microsoft.com/office/drawing/2010/main" val="0"/>
-              </a:ext>
-            </a:extLst>
-          </a:blip>
-          <a:stretch>
-            <a:fillRect/>
-          </a:stretch>
-        </p:blipFill>
-        <p:spPr>
-          <a:xfrm>
-            <a:off x="8924758" y="9008294"/>
-            <a:ext cx="3836836" cy="2317020"/>
-          </a:xfrm>
-          <a:prstGeom prst="rect">
-            <a:avLst/>
-          </a:prstGeom>
-        </p:spPr>
-      </p:pic>
-      <p:pic>
-        <p:nvPicPr>
-          <p:cNvPr id="8" name="图片 7"/>
-          <p:cNvPicPr>
-            <a:picLocks noChangeAspect="1"/>
-          </p:cNvPicPr>
-          <p:nvPr/>
-        </p:nvPicPr>
-        <p:blipFill>
-          <a:blip r:embed="rId17" cstate="print">
-            <a:extLst>
-              <a:ext uri="{28A0092B-C50C-407E-A947-70E740481C1C}">
-                <a14:useLocalDpi xmlns:a14="http://schemas.microsoft.com/office/drawing/2010/main" val="0"/>
-              </a:ext>
-            </a:extLst>
-          </a:blip>
-          <a:stretch>
-            <a:fillRect/>
-          </a:stretch>
-        </p:blipFill>
-        <p:spPr>
-          <a:xfrm>
-            <a:off x="13650822" y="9008294"/>
-            <a:ext cx="3812531" cy="2288445"/>
-          </a:xfrm>
-          <a:prstGeom prst="rect">
-            <a:avLst/>
-          </a:prstGeom>
-        </p:spPr>
-      </p:pic>
-      <p:pic>
-        <p:nvPicPr>
-          <p:cNvPr id="15" name="图片 14"/>
-          <p:cNvPicPr>
-            <a:picLocks noChangeAspect="1"/>
-          </p:cNvPicPr>
-          <p:nvPr/>
-        </p:nvPicPr>
-        <p:blipFill>
-          <a:blip r:embed="rId18" cstate="print">
-            <a:extLst>
-              <a:ext uri="{28A0092B-C50C-407E-A947-70E740481C1C}">
-                <a14:useLocalDpi xmlns:a14="http://schemas.microsoft.com/office/drawing/2010/main" val="0"/>
-              </a:ext>
-            </a:extLst>
-          </a:blip>
-          <a:stretch>
-            <a:fillRect/>
-          </a:stretch>
-        </p:blipFill>
-        <p:spPr>
-          <a:xfrm>
-            <a:off x="11520248" y="15044210"/>
-            <a:ext cx="3956268" cy="2379530"/>
-          </a:xfrm>
-          <a:prstGeom prst="rect">
-            <a:avLst/>
-          </a:prstGeom>
-        </p:spPr>
-      </p:pic>
-      <p:pic>
-        <p:nvPicPr>
-          <p:cNvPr id="17" name="图片 16"/>
-          <p:cNvPicPr>
-            <a:picLocks noChangeAspect="1"/>
-          </p:cNvPicPr>
-          <p:nvPr/>
-        </p:nvPicPr>
-        <p:blipFill>
-          <a:blip r:embed="rId19" cstate="print">
-            <a:extLst>
-              <a:ext uri="{28A0092B-C50C-407E-A947-70E740481C1C}">
-                <a14:useLocalDpi xmlns:a14="http://schemas.microsoft.com/office/drawing/2010/main" val="0"/>
-              </a:ext>
-            </a:extLst>
-          </a:blip>
-          <a:stretch>
-            <a:fillRect/>
-          </a:stretch>
-        </p:blipFill>
-        <p:spPr>
-          <a:xfrm>
-            <a:off x="19310849" y="15044210"/>
-            <a:ext cx="3977507" cy="2135637"/>
-          </a:xfrm>
-          <a:prstGeom prst="rect">
-            <a:avLst/>
-          </a:prstGeom>
-        </p:spPr>
-      </p:pic>
+      <p:sp>
+        <p:nvSpPr>
+          <p:cNvPr id="45" name="下箭头 44"/>
+          <p:cNvSpPr/>
+          <p:nvPr/>
+        </p:nvSpPr>
+        <p:spPr>
+          <a:xfrm>
+            <a:off x="29921196" y="16879189"/>
+            <a:ext cx="525511" cy="1162420"/>
+          </a:xfrm>
+          <a:prstGeom prst="downArrow">
+            <a:avLst/>
+          </a:prstGeom>
+        </p:spPr>
+        <p:style>
+          <a:lnRef idx="2">
+            <a:schemeClr val="accent1">
+              <a:shade val="50000"/>
+            </a:schemeClr>
+          </a:lnRef>
+          <a:fillRef idx="1">
+            <a:schemeClr val="accent1"/>
+          </a:fillRef>
+          <a:effectRef idx="0">
+            <a:schemeClr val="accent1"/>
+          </a:effectRef>
+          <a:fontRef idx="minor">
+            <a:schemeClr val="lt1"/>
+          </a:fontRef>
+        </p:style>
+        <p:txBody>
+          <a:bodyPr rtlCol="0" anchor="ctr"/>
+          <a:lstStyle/>
+          <a:p>
+            <a:pPr algn="ctr"/>
+            <a:endParaRPr lang="zh-CN" altLang="en-US"/>
+          </a:p>
+        </p:txBody>
+      </p:sp>
     </p:spTree>
     <p:extLst>
       <p:ext uri="{BB962C8B-B14F-4D97-AF65-F5344CB8AC3E}">

</xml_diff>

<commit_message>
small adgust on the poster
</commit_message>
<xml_diff>
--- a/poster/poster.pptx
+++ b/poster/poster.pptx
@@ -1606,17 +1606,7 @@
                 <a:latin typeface="Arial" pitchFamily="34" charset="0"/>
                 <a:cs typeface="Arial" pitchFamily="34" charset="0"/>
               </a:rPr>
-              <a:t>The New York Times Obama budget </a:t>
-            </a:r>
-            <a:r>
-              <a:rPr lang="en-US" altLang="zh-CN" sz="3600" b="1" dirty="0" smtClean="0">
-                <a:solidFill>
-                  <a:srgbClr val="9E7E38"/>
-                </a:solidFill>
-                <a:latin typeface="Arial" pitchFamily="34" charset="0"/>
-                <a:cs typeface="Arial" pitchFamily="34" charset="0"/>
-              </a:rPr>
-              <a:t>data</a:t>
+              <a:t>The New York Times Obama budget data</a:t>
             </a:r>
           </a:p>
           <a:p>
@@ -2134,7 +2124,7 @@
         </p:nvSpPr>
         <p:spPr>
           <a:xfrm>
-            <a:off x="25998984" y="11333885"/>
+            <a:off x="25998984" y="11460954"/>
             <a:ext cx="2231889" cy="757060"/>
           </a:xfrm>
           <a:prstGeom prst="bentArrow">
@@ -2178,7 +2168,7 @@
         </p:nvSpPr>
         <p:spPr>
           <a:xfrm flipV="1">
-            <a:off x="25994785" y="14170066"/>
+            <a:off x="25994785" y="13940092"/>
             <a:ext cx="1686759" cy="715957"/>
           </a:xfrm>
           <a:prstGeom prst="bentArrow">

</xml_diff>